<commit_message>
ppt has been updated
</commit_message>
<xml_diff>
--- a/DP02_Bridge_Pattern.pptx
+++ b/DP02_Bridge_Pattern.pptx
@@ -10261,8 +10261,12 @@
           <a:lstStyle/>
           <a:p>
             <a:r>
-              <a:rPr lang="hu-HU" dirty="0" err="1" smtClean="0"/>
-              <a:t>BridgeExample</a:t>
+              <a:rPr lang="hu-HU" dirty="0"/>
+              <a:t>https://</a:t>
+            </a:r>
+            <a:r>
+              <a:rPr lang="hu-HU" dirty="0" smtClean="0"/>
+              <a:t>github.com/esziger/design_patterns/tree/master/Bridge_Examples/BridgeExample_Base/</a:t>
             </a:r>
             <a:endParaRPr lang="hu-HU" dirty="0"/>
           </a:p>
@@ -10451,16 +10455,12 @@
           </a:p>
           <a:p>
             <a:r>
-              <a:rPr lang="hu-HU" dirty="0" err="1" smtClean="0"/>
-              <a:t>BridgeExample</a:t>
+              <a:rPr lang="hu-HU" dirty="0"/>
+              <a:t>https://</a:t>
             </a:r>
             <a:r>
               <a:rPr lang="hu-HU" dirty="0" smtClean="0"/>
-              <a:t>_</a:t>
-            </a:r>
-            <a:r>
-              <a:rPr lang="hu-HU" dirty="0" err="1" smtClean="0"/>
-              <a:t>wrongSolution</a:t>
+              <a:t>github.com/esziger/design_patterns/tree/master/Bridge_Examples/BridgeExample_WrongSolution/</a:t>
             </a:r>
             <a:endParaRPr lang="hu-HU" dirty="0"/>
           </a:p>
@@ -10511,7 +10511,7 @@
         </p:blipFill>
         <p:spPr>
           <a:xfrm>
-            <a:off x="4460740" y="3145621"/>
+            <a:off x="5339978" y="3507570"/>
             <a:ext cx="5850579" cy="3031342"/>
           </a:xfrm>
           <a:prstGeom prst="rect">
@@ -10578,11 +10578,7 @@
             </a:r>
             <a:r>
               <a:rPr lang="hu-HU" dirty="0" smtClean="0"/>
-              <a:t> </a:t>
-            </a:r>
-            <a:r>
-              <a:rPr lang="hu-HU" dirty="0" smtClean="0"/>
-              <a:t>- </a:t>
+              <a:t> - </a:t>
             </a:r>
             <a:r>
               <a:rPr lang="hu-HU" dirty="0" err="1" smtClean="0"/>
@@ -10633,7 +10629,7 @@
             </a:r>
             <a:r>
               <a:rPr lang="hu-HU" dirty="0" err="1" smtClean="0"/>
-              <a:t>using</a:t>
+              <a:t>Bridge</a:t>
             </a:r>
             <a:r>
               <a:rPr lang="hu-HU" dirty="0" smtClean="0"/>
@@ -10641,15 +10637,22 @@
             </a:r>
             <a:r>
               <a:rPr lang="hu-HU" dirty="0" err="1" smtClean="0"/>
-              <a:t>Bridge</a:t>
-            </a:r>
-            <a:r>
-              <a:rPr lang="hu-HU" dirty="0" smtClean="0"/>
-              <a:t> </a:t>
-            </a:r>
-            <a:r>
-              <a:rPr lang="hu-HU" dirty="0" err="1" smtClean="0"/>
               <a:t>Pattern</a:t>
+            </a:r>
+            <a:endParaRPr lang="hu-HU" dirty="0" smtClean="0"/>
+          </a:p>
+          <a:p>
+            <a:r>
+              <a:rPr lang="hu-HU" dirty="0"/>
+              <a:t>https</a:t>
+            </a:r>
+            <a:r>
+              <a:rPr lang="hu-HU"/>
+              <a:t>://</a:t>
+            </a:r>
+            <a:r>
+              <a:rPr lang="hu-HU" smtClean="0"/>
+              <a:t>github.com/esziger/design_patterns/tree/master/Bridge_Examples/BridgeExample_BackwardsBook/</a:t>
             </a:r>
             <a:endParaRPr lang="hu-HU" dirty="0" smtClean="0"/>
           </a:p>

</xml_diff>

<commit_message>
ppt updated. Bridge pattern part is ready.
</commit_message>
<xml_diff>
--- a/DP02_Bridge_Pattern.pptx
+++ b/DP02_Bridge_Pattern.pptx
@@ -5,7 +5,7 @@
     <p:sldMasterId id="2147483660" r:id="rId1"/>
   </p:sldMasterIdLst>
   <p:notesMasterIdLst>
-    <p:notesMasterId r:id="rId16"/>
+    <p:notesMasterId r:id="rId19"/>
   </p:notesMasterIdLst>
   <p:sldIdLst>
     <p:sldId id="256" r:id="rId2"/>
@@ -17,11 +17,14 @@
     <p:sldId id="288" r:id="rId8"/>
     <p:sldId id="289" r:id="rId9"/>
     <p:sldId id="290" r:id="rId10"/>
-    <p:sldId id="291" r:id="rId11"/>
-    <p:sldId id="275" r:id="rId12"/>
-    <p:sldId id="263" r:id="rId13"/>
-    <p:sldId id="264" r:id="rId14"/>
-    <p:sldId id="292" r:id="rId15"/>
+    <p:sldId id="293" r:id="rId11"/>
+    <p:sldId id="294" r:id="rId12"/>
+    <p:sldId id="291" r:id="rId13"/>
+    <p:sldId id="275" r:id="rId14"/>
+    <p:sldId id="263" r:id="rId15"/>
+    <p:sldId id="295" r:id="rId16"/>
+    <p:sldId id="264" r:id="rId17"/>
+    <p:sldId id="292" r:id="rId18"/>
   </p:sldIdLst>
   <p:sldSz cx="12192000" cy="6858000"/>
   <p:notesSz cx="6858000" cy="9144000"/>
@@ -4189,6 +4192,187 @@
               <a:rPr lang="hu-HU" baseline="0" dirty="0" smtClean="0"/>
               <a:t>.</a:t>
             </a:r>
+          </a:p>
+          <a:p>
+            <a:endParaRPr lang="hu-HU" baseline="0" dirty="0" smtClean="0"/>
+          </a:p>
+          <a:p>
+            <a:r>
+              <a:rPr lang="hu-HU" baseline="0" dirty="0" err="1" smtClean="0"/>
+              <a:t>We</a:t>
+            </a:r>
+            <a:r>
+              <a:rPr lang="hu-HU" baseline="0" dirty="0" smtClean="0"/>
+              <a:t> </a:t>
+            </a:r>
+            <a:r>
+              <a:rPr lang="hu-HU" baseline="0" dirty="0" err="1" smtClean="0"/>
+              <a:t>refer</a:t>
+            </a:r>
+            <a:r>
+              <a:rPr lang="hu-HU" baseline="0" dirty="0" smtClean="0"/>
+              <a:t> </a:t>
+            </a:r>
+            <a:r>
+              <a:rPr lang="hu-HU" baseline="0" dirty="0" err="1" smtClean="0"/>
+              <a:t>to</a:t>
+            </a:r>
+            <a:r>
+              <a:rPr lang="hu-HU" baseline="0" dirty="0" smtClean="0"/>
+              <a:t> </a:t>
+            </a:r>
+            <a:r>
+              <a:rPr lang="hu-HU" baseline="0" dirty="0" err="1" smtClean="0"/>
+              <a:t>the</a:t>
+            </a:r>
+            <a:r>
+              <a:rPr lang="hu-HU" baseline="0" dirty="0" smtClean="0"/>
+              <a:t> </a:t>
+            </a:r>
+            <a:r>
+              <a:rPr lang="hu-HU" baseline="0" dirty="0" err="1" smtClean="0"/>
+              <a:t>relationship</a:t>
+            </a:r>
+            <a:r>
+              <a:rPr lang="hu-HU" baseline="0" dirty="0" smtClean="0"/>
+              <a:t> </a:t>
+            </a:r>
+            <a:r>
+              <a:rPr lang="hu-HU" baseline="0" dirty="0" err="1" smtClean="0"/>
+              <a:t>between</a:t>
+            </a:r>
+            <a:r>
+              <a:rPr lang="hu-HU" baseline="0" dirty="0" smtClean="0"/>
+              <a:t> </a:t>
+            </a:r>
+            <a:r>
+              <a:rPr lang="hu-HU" baseline="0" dirty="0" err="1" smtClean="0"/>
+              <a:t>IManuScript</a:t>
+            </a:r>
+            <a:r>
+              <a:rPr lang="hu-HU" baseline="0" dirty="0" smtClean="0"/>
+              <a:t> an </a:t>
+            </a:r>
+            <a:r>
+              <a:rPr lang="hu-HU" baseline="0" dirty="0" err="1" smtClean="0"/>
+              <a:t>Iformatter</a:t>
+            </a:r>
+            <a:r>
+              <a:rPr lang="hu-HU" baseline="0" dirty="0" smtClean="0"/>
+              <a:t> </a:t>
+            </a:r>
+            <a:r>
+              <a:rPr lang="hu-HU" baseline="0" dirty="0" err="1" smtClean="0"/>
+              <a:t>as</a:t>
+            </a:r>
+            <a:r>
+              <a:rPr lang="hu-HU" baseline="0" dirty="0" smtClean="0"/>
+              <a:t> a </a:t>
+            </a:r>
+            <a:r>
+              <a:rPr lang="hu-HU" baseline="0" dirty="0" err="1" smtClean="0"/>
+              <a:t>bridge</a:t>
+            </a:r>
+            <a:r>
+              <a:rPr lang="hu-HU" baseline="0" dirty="0" smtClean="0"/>
+              <a:t>, </a:t>
+            </a:r>
+            <a:r>
+              <a:rPr lang="hu-HU" baseline="0" dirty="0" err="1" smtClean="0"/>
+              <a:t>because</a:t>
+            </a:r>
+            <a:r>
+              <a:rPr lang="hu-HU" baseline="0" dirty="0" smtClean="0"/>
+              <a:t> </a:t>
+            </a:r>
+            <a:r>
+              <a:rPr lang="hu-HU" baseline="0" dirty="0" err="1" smtClean="0"/>
+              <a:t>its</a:t>
+            </a:r>
+            <a:r>
+              <a:rPr lang="hu-HU" baseline="0" dirty="0" smtClean="0"/>
+              <a:t> </a:t>
+            </a:r>
+            <a:r>
+              <a:rPr lang="hu-HU" baseline="0" dirty="0" err="1" smtClean="0"/>
+              <a:t>bridges</a:t>
+            </a:r>
+            <a:r>
+              <a:rPr lang="hu-HU" baseline="0" dirty="0" smtClean="0"/>
+              <a:t> </a:t>
+            </a:r>
+            <a:r>
+              <a:rPr lang="hu-HU" baseline="0" dirty="0" err="1" smtClean="0"/>
+              <a:t>the</a:t>
+            </a:r>
+            <a:r>
+              <a:rPr lang="hu-HU" baseline="0" dirty="0" smtClean="0"/>
+              <a:t> </a:t>
+            </a:r>
+            <a:r>
+              <a:rPr lang="hu-HU" baseline="0" dirty="0" err="1" smtClean="0"/>
+              <a:t>abstraction</a:t>
+            </a:r>
+            <a:r>
+              <a:rPr lang="hu-HU" baseline="0" dirty="0" smtClean="0"/>
+              <a:t> and </a:t>
+            </a:r>
+            <a:r>
+              <a:rPr lang="hu-HU" baseline="0" dirty="0" err="1" smtClean="0"/>
+              <a:t>its</a:t>
+            </a:r>
+            <a:r>
+              <a:rPr lang="hu-HU" baseline="0" dirty="0" smtClean="0"/>
+              <a:t> </a:t>
+            </a:r>
+            <a:r>
+              <a:rPr lang="hu-HU" baseline="0" dirty="0" err="1" smtClean="0"/>
+              <a:t>implementation</a:t>
+            </a:r>
+            <a:r>
+              <a:rPr lang="hu-HU" baseline="0" dirty="0" smtClean="0"/>
+              <a:t>, </a:t>
+            </a:r>
+            <a:r>
+              <a:rPr lang="hu-HU" baseline="0" dirty="0" err="1" smtClean="0"/>
+              <a:t>and</a:t>
+            </a:r>
+            <a:r>
+              <a:rPr lang="hu-HU" baseline="0" dirty="0" smtClean="0"/>
+              <a:t> </a:t>
+            </a:r>
+            <a:r>
+              <a:rPr lang="hu-HU" baseline="0" dirty="0" err="1" smtClean="0"/>
+              <a:t>letting</a:t>
+            </a:r>
+            <a:r>
+              <a:rPr lang="hu-HU" baseline="0" dirty="0" smtClean="0"/>
+              <a:t> </a:t>
+            </a:r>
+            <a:r>
+              <a:rPr lang="hu-HU" baseline="0" dirty="0" err="1" smtClean="0"/>
+              <a:t>them</a:t>
+            </a:r>
+            <a:r>
+              <a:rPr lang="hu-HU" baseline="0" dirty="0" smtClean="0"/>
+              <a:t> </a:t>
+            </a:r>
+            <a:r>
+              <a:rPr lang="hu-HU" baseline="0" dirty="0" err="1" smtClean="0"/>
+              <a:t>vary</a:t>
+            </a:r>
+            <a:r>
+              <a:rPr lang="hu-HU" baseline="0" dirty="0" smtClean="0"/>
+              <a:t> </a:t>
+            </a:r>
+            <a:r>
+              <a:rPr lang="hu-HU" baseline="0" dirty="0" err="1" smtClean="0"/>
+              <a:t>independently</a:t>
+            </a:r>
+            <a:r>
+              <a:rPr lang="hu-HU" baseline="0" dirty="0" smtClean="0"/>
+              <a:t>.</a:t>
+            </a:r>
             <a:endParaRPr lang="hu-HU" dirty="0"/>
           </a:p>
         </p:txBody>
@@ -4970,6 +5154,114 @@
           </a:p>
           <a:p>
             <a:r>
+              <a:rPr lang="hu-HU" sz="1200" b="0" i="0" u="none" strike="noStrike" kern="1200" baseline="0" dirty="0" err="1" smtClean="0">
+                <a:solidFill>
+                  <a:schemeClr val="tx1"/>
+                </a:solidFill>
+                <a:latin typeface="+mn-lt"/>
+                <a:ea typeface="+mn-ea"/>
+                <a:cs typeface="+mn-cs"/>
+              </a:rPr>
+              <a:t>Typically</a:t>
+            </a:r>
+            <a:r>
+              <a:rPr lang="hu-HU" sz="1200" b="0" i="0" u="none" strike="noStrike" kern="1200" baseline="0" dirty="0" smtClean="0">
+                <a:solidFill>
+                  <a:schemeClr val="tx1"/>
+                </a:solidFill>
+                <a:latin typeface="+mn-lt"/>
+                <a:ea typeface="+mn-ea"/>
+                <a:cs typeface="+mn-cs"/>
+              </a:rPr>
+              <a:t> </a:t>
+            </a:r>
+            <a:r>
+              <a:rPr lang="hu-HU" sz="1200" b="0" i="0" u="none" strike="noStrike" kern="1200" baseline="0" dirty="0" err="1" smtClean="0">
+                <a:solidFill>
+                  <a:schemeClr val="tx1"/>
+                </a:solidFill>
+                <a:latin typeface="+mn-lt"/>
+                <a:ea typeface="+mn-ea"/>
+                <a:cs typeface="+mn-cs"/>
+              </a:rPr>
+              <a:t>the</a:t>
+            </a:r>
+            <a:endParaRPr lang="hu-HU" sz="1200" b="0" i="0" u="none" strike="noStrike" kern="1200" baseline="0" dirty="0" smtClean="0">
+              <a:solidFill>
+                <a:schemeClr val="tx1"/>
+              </a:solidFill>
+              <a:latin typeface="+mn-lt"/>
+              <a:ea typeface="+mn-ea"/>
+              <a:cs typeface="+mn-cs"/>
+            </a:endParaRPr>
+          </a:p>
+          <a:p>
+            <a:r>
+              <a:rPr lang="en-US" sz="1200" b="0" i="0" u="none" strike="noStrike" kern="1200" baseline="0" dirty="0" err="1" smtClean="0">
+                <a:solidFill>
+                  <a:schemeClr val="tx1"/>
+                </a:solidFill>
+                <a:latin typeface="+mn-lt"/>
+                <a:ea typeface="+mn-ea"/>
+                <a:cs typeface="+mn-cs"/>
+              </a:rPr>
+              <a:t>Implementor</a:t>
+            </a:r>
+            <a:r>
+              <a:rPr lang="en-US" sz="1200" b="0" i="0" u="none" strike="noStrike" kern="1200" baseline="0" dirty="0" smtClean="0">
+                <a:solidFill>
+                  <a:schemeClr val="tx1"/>
+                </a:solidFill>
+                <a:latin typeface="+mn-lt"/>
+                <a:ea typeface="+mn-ea"/>
+                <a:cs typeface="+mn-cs"/>
+              </a:rPr>
+              <a:t> interface provides only primitive operations, and</a:t>
+            </a:r>
+          </a:p>
+          <a:p>
+            <a:r>
+              <a:rPr lang="en-US" sz="1200" b="0" i="0" u="none" strike="noStrike" kern="1200" baseline="0" dirty="0" smtClean="0">
+                <a:solidFill>
+                  <a:schemeClr val="tx1"/>
+                </a:solidFill>
+                <a:latin typeface="+mn-lt"/>
+                <a:ea typeface="+mn-ea"/>
+                <a:cs typeface="+mn-cs"/>
+              </a:rPr>
+              <a:t>Abstraction defines higher-level operations based on these</a:t>
+            </a:r>
+          </a:p>
+          <a:p>
+            <a:r>
+              <a:rPr lang="hu-HU" sz="1200" b="0" i="0" u="none" strike="noStrike" kern="1200" baseline="0" dirty="0" err="1" smtClean="0">
+                <a:solidFill>
+                  <a:schemeClr val="tx1"/>
+                </a:solidFill>
+                <a:latin typeface="+mn-lt"/>
+                <a:ea typeface="+mn-ea"/>
+                <a:cs typeface="+mn-cs"/>
+              </a:rPr>
+              <a:t>primitives</a:t>
+            </a:r>
+            <a:r>
+              <a:rPr lang="hu-HU" sz="1200" b="0" i="0" u="none" strike="noStrike" kern="1200" baseline="0" dirty="0" smtClean="0">
+                <a:solidFill>
+                  <a:schemeClr val="tx1"/>
+                </a:solidFill>
+                <a:latin typeface="+mn-lt"/>
+                <a:ea typeface="+mn-ea"/>
+                <a:cs typeface="+mn-cs"/>
+              </a:rPr>
+              <a:t>.</a:t>
+            </a:r>
+            <a:endParaRPr lang="hu-HU" baseline="0" dirty="0" smtClean="0"/>
+          </a:p>
+          <a:p>
+            <a:endParaRPr lang="hu-HU" baseline="0" dirty="0" smtClean="0"/>
+          </a:p>
+          <a:p>
+            <a:r>
               <a:rPr lang="hu-HU" baseline="0" dirty="0" err="1" smtClean="0"/>
               <a:t>Implementor</a:t>
             </a:r>
@@ -5683,7 +5975,7 @@
           <a:p>
             <a:fld id="{27C334D5-55AD-42ED-8491-40C1A78BB94C}" type="slidenum">
               <a:rPr lang="hu-HU" smtClean="0"/>
-              <a:t>10</a:t>
+              <a:t>12</a:t>
             </a:fld>
             <a:endParaRPr lang="hu-HU"/>
           </a:p>
@@ -8636,9 +8928,10 @@
           <a:lstStyle/>
           <a:p>
             <a:r>
-              <a:rPr lang="hu-HU" dirty="0"/>
+              <a:rPr lang="hu-HU" dirty="0" smtClean="0"/>
               <a:t>Gergely Szilágyi</a:t>
             </a:r>
+            <a:endParaRPr lang="hu-HU" dirty="0"/>
           </a:p>
         </p:txBody>
       </p:sp>
@@ -8712,15 +9005,7 @@
           <a:p>
             <a:r>
               <a:rPr lang="hu-HU" dirty="0" err="1" smtClean="0"/>
-              <a:t>Common</a:t>
-            </a:r>
-            <a:r>
-              <a:rPr lang="hu-HU" dirty="0" smtClean="0"/>
-              <a:t> </a:t>
-            </a:r>
-            <a:r>
-              <a:rPr lang="hu-HU" dirty="0" err="1" smtClean="0"/>
-              <a:t>Usages</a:t>
+              <a:t>Applicability</a:t>
             </a:r>
             <a:endParaRPr lang="hu-HU" dirty="0"/>
           </a:p>
@@ -8738,161 +9023,222 @@
         </p:nvSpPr>
         <p:spPr/>
         <p:txBody>
-          <a:bodyPr/>
+          <a:bodyPr>
+            <a:normAutofit lnSpcReduction="10000"/>
+          </a:bodyPr>
           <a:lstStyle/>
           <a:p>
             <a:r>
               <a:rPr lang="hu-HU" dirty="0" err="1" smtClean="0"/>
-              <a:t>Persistence</a:t>
+              <a:t>Use</a:t>
+            </a:r>
+            <a:r>
+              <a:rPr lang="hu-HU" dirty="0" smtClean="0"/>
+              <a:t> </a:t>
+            </a:r>
+            <a:r>
+              <a:rPr lang="hu-HU" dirty="0" err="1" smtClean="0"/>
+              <a:t>the</a:t>
+            </a:r>
+            <a:r>
+              <a:rPr lang="hu-HU" dirty="0" smtClean="0"/>
+              <a:t> </a:t>
+            </a:r>
+            <a:r>
+              <a:rPr lang="hu-HU" dirty="0" err="1" smtClean="0"/>
+              <a:t>Bridge</a:t>
+            </a:r>
+            <a:r>
+              <a:rPr lang="hu-HU" dirty="0" smtClean="0"/>
+              <a:t> </a:t>
+            </a:r>
+            <a:r>
+              <a:rPr lang="hu-HU" dirty="0" err="1" smtClean="0"/>
+              <a:t>pattern</a:t>
+            </a:r>
+            <a:r>
+              <a:rPr lang="hu-HU" dirty="0" smtClean="0"/>
+              <a:t> </a:t>
+            </a:r>
+            <a:r>
+              <a:rPr lang="hu-HU" dirty="0" err="1" smtClean="0"/>
+              <a:t>when</a:t>
+            </a:r>
+            <a:r>
+              <a:rPr lang="hu-HU" dirty="0" smtClean="0"/>
+              <a:t>:</a:t>
+            </a:r>
+          </a:p>
+          <a:p>
+            <a:pPr lvl="1"/>
+            <a:r>
+              <a:rPr lang="hu-HU" dirty="0"/>
+              <a:t>y</a:t>
+            </a:r>
+            <a:r>
+              <a:rPr lang="en-US" dirty="0" err="1" smtClean="0"/>
+              <a:t>ou</a:t>
+            </a:r>
+            <a:r>
+              <a:rPr lang="en-US" dirty="0" smtClean="0"/>
+              <a:t> </a:t>
+            </a:r>
+            <a:r>
+              <a:rPr lang="en-US" dirty="0"/>
+              <a:t>want to avoid a permanent binding between an abstraction and </a:t>
+            </a:r>
+            <a:r>
+              <a:rPr lang="en-US" dirty="0" smtClean="0"/>
+              <a:t>its</a:t>
+            </a:r>
+            <a:r>
+              <a:rPr lang="hu-HU" dirty="0" smtClean="0"/>
+              <a:t> </a:t>
+            </a:r>
+            <a:r>
+              <a:rPr lang="en-US" dirty="0" smtClean="0"/>
+              <a:t>implementation</a:t>
+            </a:r>
+            <a:r>
+              <a:rPr lang="en-US" dirty="0"/>
+              <a:t>. This might be the case, for example, when the </a:t>
+            </a:r>
+            <a:r>
+              <a:rPr lang="en-US" dirty="0" smtClean="0"/>
+              <a:t>implementation</a:t>
             </a:r>
             <a:endParaRPr lang="hu-HU" dirty="0" smtClean="0"/>
           </a:p>
           <a:p>
             <a:pPr lvl="1"/>
             <a:r>
-              <a:rPr lang="hu-HU" dirty="0" err="1" smtClean="0"/>
-              <a:t>Database</a:t>
-            </a:r>
-            <a:r>
-              <a:rPr lang="hu-HU" dirty="0" smtClean="0"/>
-              <a:t> </a:t>
-            </a:r>
-            <a:r>
-              <a:rPr lang="hu-HU" dirty="0" err="1" smtClean="0"/>
-              <a:t>persistence</a:t>
+              <a:rPr lang="en-US" dirty="0"/>
+              <a:t>both the abstractions and their implementations should be extensible </a:t>
+            </a:r>
+            <a:r>
+              <a:rPr lang="en-US" dirty="0" smtClean="0"/>
+              <a:t>by</a:t>
+            </a:r>
+            <a:r>
+              <a:rPr lang="hu-HU" dirty="0" smtClean="0"/>
+              <a:t> </a:t>
+            </a:r>
+            <a:r>
+              <a:rPr lang="en-US" dirty="0" err="1" smtClean="0"/>
+              <a:t>subclassing</a:t>
+            </a:r>
+            <a:r>
+              <a:rPr lang="en-US" dirty="0"/>
+              <a:t>. In this case, the Bridge pattern lets you combine the </a:t>
+            </a:r>
+            <a:r>
+              <a:rPr lang="en-US" dirty="0" smtClean="0"/>
+              <a:t>different</a:t>
+            </a:r>
+            <a:r>
+              <a:rPr lang="hu-HU" dirty="0" smtClean="0"/>
+              <a:t> </a:t>
+            </a:r>
+            <a:r>
+              <a:rPr lang="en-US" dirty="0" smtClean="0"/>
+              <a:t>abstractions </a:t>
+            </a:r>
+            <a:r>
+              <a:rPr lang="en-US" dirty="0"/>
+              <a:t>and implementations and extend them </a:t>
+            </a:r>
+            <a:r>
+              <a:rPr lang="en-US" dirty="0" err="1"/>
+              <a:t>independently.</a:t>
+            </a:r>
+            <a:r>
+              <a:rPr lang="en-US" dirty="0" err="1" smtClean="0"/>
+              <a:t>n</a:t>
+            </a:r>
+            <a:r>
+              <a:rPr lang="hu-HU" dirty="0" smtClean="0"/>
+              <a:t> </a:t>
+            </a:r>
+            <a:r>
+              <a:rPr lang="en-US" dirty="0" smtClean="0"/>
+              <a:t>must </a:t>
+            </a:r>
+            <a:r>
+              <a:rPr lang="en-US" dirty="0"/>
+              <a:t>be selected or switched at run-time</a:t>
+            </a:r>
+            <a:r>
+              <a:rPr lang="en-US" dirty="0" smtClean="0"/>
+              <a:t>.</a:t>
             </a:r>
             <a:endParaRPr lang="hu-HU" dirty="0" smtClean="0"/>
           </a:p>
           <a:p>
             <a:pPr lvl="1"/>
             <a:r>
-              <a:rPr lang="hu-HU" dirty="0" err="1" smtClean="0"/>
-              <a:t>Filesystem</a:t>
-            </a:r>
-            <a:r>
-              <a:rPr lang="hu-HU" dirty="0" smtClean="0"/>
-              <a:t> </a:t>
-            </a:r>
-            <a:r>
-              <a:rPr lang="hu-HU" dirty="0" err="1" smtClean="0"/>
-              <a:t>persistence</a:t>
-            </a:r>
-            <a:endParaRPr lang="hu-HU" dirty="0" smtClean="0"/>
+              <a:rPr lang="en-US" dirty="0" smtClean="0"/>
+              <a:t>(C</a:t>
+            </a:r>
+            <a:r>
+              <a:rPr lang="en-US" dirty="0"/>
+              <a:t>++) you want to hide the implementation of an abstraction completely </a:t>
+            </a:r>
+            <a:r>
+              <a:rPr lang="en-US" dirty="0" smtClean="0"/>
+              <a:t>from</a:t>
+            </a:r>
+            <a:r>
+              <a:rPr lang="hu-HU" dirty="0" smtClean="0"/>
+              <a:t> </a:t>
+            </a:r>
+            <a:r>
+              <a:rPr lang="en-US" dirty="0" smtClean="0"/>
+              <a:t>clients</a:t>
+            </a:r>
+            <a:r>
+              <a:rPr lang="hu-HU" dirty="0" smtClean="0"/>
+              <a:t>.</a:t>
+            </a:r>
           </a:p>
           <a:p>
             <a:pPr lvl="1"/>
             <a:r>
-              <a:rPr lang="hu-HU" dirty="0" err="1" smtClean="0"/>
-              <a:t>Streaming</a:t>
-            </a:r>
-            <a:r>
-              <a:rPr lang="hu-HU" dirty="0" smtClean="0"/>
-              <a:t> over </a:t>
-            </a:r>
-            <a:r>
-              <a:rPr lang="hu-HU" dirty="0" err="1" smtClean="0"/>
-              <a:t>the</a:t>
-            </a:r>
-            <a:r>
-              <a:rPr lang="hu-HU" dirty="0" smtClean="0"/>
-              <a:t> </a:t>
-            </a:r>
-            <a:r>
-              <a:rPr lang="hu-HU" dirty="0" err="1" smtClean="0"/>
-              <a:t>network</a:t>
-            </a:r>
-            <a:r>
-              <a:rPr lang="hu-HU" dirty="0" smtClean="0"/>
-              <a:t> </a:t>
-            </a:r>
-            <a:r>
-              <a:rPr lang="hu-HU" dirty="0" err="1" smtClean="0"/>
-              <a:t>persistence</a:t>
-            </a:r>
-            <a:endParaRPr lang="hu-HU" dirty="0" smtClean="0"/>
-          </a:p>
-          <a:p>
+              <a:rPr lang="en-US" dirty="0"/>
+              <a:t>you have a proliferation of classes as shown earlier in the first </a:t>
+            </a:r>
+            <a:r>
+              <a:rPr lang="en-US" dirty="0" smtClean="0"/>
+              <a:t>Motivation</a:t>
+            </a:r>
+            <a:r>
+              <a:rPr lang="hu-HU" dirty="0" smtClean="0"/>
+              <a:t> </a:t>
+            </a:r>
+            <a:r>
+              <a:rPr lang="en-US" dirty="0" smtClean="0"/>
+              <a:t>diagram</a:t>
+            </a:r>
+            <a:r>
+              <a:rPr lang="en-US" dirty="0"/>
+              <a:t>. Such a class hierarchy indicates the need for splitting an </a:t>
+            </a:r>
+            <a:r>
+              <a:rPr lang="en-US" dirty="0" smtClean="0"/>
+              <a:t>object</a:t>
+            </a:r>
+            <a:r>
+              <a:rPr lang="hu-HU" dirty="0" smtClean="0"/>
+              <a:t> </a:t>
+            </a:r>
+            <a:r>
+              <a:rPr lang="en-US" dirty="0"/>
+              <a:t>into two parts</a:t>
+            </a:r>
+            <a:r>
+              <a:rPr lang="en-US" dirty="0" smtClean="0"/>
+              <a:t>. </a:t>
+            </a:r>
             <a:endParaRPr lang="hu-HU" dirty="0"/>
-          </a:p>
-          <a:p>
-            <a:r>
-              <a:rPr lang="hu-HU" dirty="0" err="1" smtClean="0"/>
-              <a:t>User</a:t>
-            </a:r>
-            <a:r>
-              <a:rPr lang="hu-HU" dirty="0" smtClean="0"/>
-              <a:t> </a:t>
-            </a:r>
-            <a:r>
-              <a:rPr lang="hu-HU" dirty="0" err="1" smtClean="0"/>
-              <a:t>Interface</a:t>
-            </a:r>
-            <a:endParaRPr lang="hu-HU" dirty="0" smtClean="0"/>
-          </a:p>
-          <a:p>
-            <a:pPr lvl="1"/>
-            <a:r>
-              <a:rPr lang="hu-HU" dirty="0" err="1" smtClean="0"/>
-              <a:t>Multiplatform</a:t>
-            </a:r>
-            <a:r>
-              <a:rPr lang="hu-HU" dirty="0" smtClean="0"/>
-              <a:t> </a:t>
-            </a:r>
-            <a:r>
-              <a:rPr lang="hu-HU" dirty="0" err="1" smtClean="0"/>
-              <a:t>interfaces</a:t>
-            </a:r>
-            <a:r>
-              <a:rPr lang="hu-HU" dirty="0" smtClean="0"/>
-              <a:t> </a:t>
-            </a:r>
-            <a:r>
-              <a:rPr lang="hu-HU" dirty="0" err="1" smtClean="0"/>
-              <a:t>usually</a:t>
-            </a:r>
-            <a:r>
-              <a:rPr lang="hu-HU" dirty="0" smtClean="0"/>
-              <a:t> </a:t>
-            </a:r>
-            <a:r>
-              <a:rPr lang="hu-HU" dirty="0" err="1" smtClean="0"/>
-              <a:t>using</a:t>
-            </a:r>
-            <a:r>
-              <a:rPr lang="hu-HU" dirty="0" smtClean="0"/>
-              <a:t> </a:t>
-            </a:r>
-            <a:r>
-              <a:rPr lang="hu-HU" dirty="0" err="1" smtClean="0"/>
-              <a:t>the</a:t>
-            </a:r>
-            <a:r>
-              <a:rPr lang="hu-HU" dirty="0" smtClean="0"/>
-              <a:t> </a:t>
-            </a:r>
-            <a:r>
-              <a:rPr lang="hu-HU" dirty="0" err="1" smtClean="0"/>
-              <a:t>Bridge</a:t>
-            </a:r>
-            <a:r>
-              <a:rPr lang="hu-HU" dirty="0" smtClean="0"/>
-              <a:t> </a:t>
-            </a:r>
-            <a:r>
-              <a:rPr lang="hu-HU" dirty="0" err="1" smtClean="0"/>
-              <a:t>Pattern</a:t>
-            </a:r>
-            <a:r>
-              <a:rPr lang="hu-HU" dirty="0" smtClean="0"/>
-              <a:t>.</a:t>
-            </a:r>
-          </a:p>
-          <a:p>
-            <a:pPr marL="457200" lvl="1" indent="0">
-              <a:buNone/>
-            </a:pPr>
-            <a:endParaRPr lang="hu-HU" dirty="0" smtClean="0"/>
           </a:p>
         </p:txBody>
       </p:sp>
@@ -8922,7 +9268,7 @@
     </p:spTree>
     <p:extLst>
       <p:ext uri="{BB962C8B-B14F-4D97-AF65-F5344CB8AC3E}">
-        <p14:creationId xmlns:p14="http://schemas.microsoft.com/office/powerpoint/2010/main" val="12491424"/>
+        <p14:creationId xmlns:p14="http://schemas.microsoft.com/office/powerpoint/2010/main" val="1889533080"/>
       </p:ext>
     </p:extLst>
   </p:cSld>
@@ -8965,8 +9311,132 @@
           <a:lstStyle/>
           <a:p>
             <a:r>
+              <a:rPr lang="hu-HU" dirty="0" err="1" smtClean="0"/>
+              <a:t>Consequences</a:t>
+            </a:r>
+            <a:endParaRPr lang="hu-HU" dirty="0"/>
+          </a:p>
+        </p:txBody>
+      </p:sp>
+      <p:sp>
+        <p:nvSpPr>
+          <p:cNvPr id="3" name="Tartalom helye 2"/>
+          <p:cNvSpPr>
+            <a:spLocks noGrp="1"/>
+          </p:cNvSpPr>
+          <p:nvPr>
+            <p:ph idx="1"/>
+          </p:nvPr>
+        </p:nvSpPr>
+        <p:spPr/>
+        <p:txBody>
+          <a:bodyPr>
+            <a:normAutofit/>
+          </a:bodyPr>
+          <a:lstStyle/>
+          <a:p>
+            <a:r>
+              <a:rPr lang="hu-HU" dirty="0" err="1" smtClean="0"/>
+              <a:t>Bridge</a:t>
+            </a:r>
+            <a:r>
+              <a:rPr lang="hu-HU" dirty="0" smtClean="0"/>
+              <a:t> </a:t>
+            </a:r>
+            <a:r>
+              <a:rPr lang="hu-HU" dirty="0" err="1" smtClean="0"/>
+              <a:t>pattern</a:t>
+            </a:r>
+            <a:r>
+              <a:rPr lang="hu-HU" dirty="0" smtClean="0"/>
+              <a:t> has </a:t>
+            </a:r>
+            <a:r>
+              <a:rPr lang="hu-HU" dirty="0" err="1" smtClean="0"/>
+              <a:t>the</a:t>
+            </a:r>
+            <a:r>
+              <a:rPr lang="hu-HU" dirty="0" smtClean="0"/>
+              <a:t> </a:t>
+            </a:r>
+            <a:r>
+              <a:rPr lang="hu-HU" dirty="0" err="1" smtClean="0"/>
+              <a:t>following</a:t>
+            </a:r>
+            <a:r>
+              <a:rPr lang="hu-HU" dirty="0" smtClean="0"/>
+              <a:t> </a:t>
+            </a:r>
+            <a:r>
+              <a:rPr lang="hu-HU" dirty="0" err="1" smtClean="0"/>
+              <a:t>consequences</a:t>
+            </a:r>
+            <a:r>
+              <a:rPr lang="hu-HU" dirty="0" smtClean="0"/>
+              <a:t>:</a:t>
+            </a:r>
+          </a:p>
+          <a:p>
+            <a:pPr lvl="1"/>
+            <a:r>
+              <a:rPr lang="en-US" i="1" dirty="0"/>
+              <a:t>Decoupling interface and implementation. </a:t>
+            </a:r>
+            <a:r>
+              <a:rPr lang="en-US" dirty="0"/>
+              <a:t>An implementation is not </a:t>
+            </a:r>
+            <a:r>
+              <a:rPr lang="en-US" dirty="0" smtClean="0"/>
+              <a:t>bound</a:t>
+            </a:r>
+            <a:r>
+              <a:rPr lang="hu-HU" dirty="0" smtClean="0"/>
+              <a:t> </a:t>
+            </a:r>
+            <a:r>
+              <a:rPr lang="en-US" dirty="0" smtClean="0"/>
+              <a:t>permanently </a:t>
+            </a:r>
+            <a:r>
+              <a:rPr lang="en-US" dirty="0"/>
+              <a:t>to an interface. The implementation of an abstraction can </a:t>
+            </a:r>
+            <a:r>
+              <a:rPr lang="en-US" dirty="0" smtClean="0"/>
+              <a:t>be</a:t>
+            </a:r>
+            <a:r>
+              <a:rPr lang="hu-HU" dirty="0" smtClean="0"/>
+              <a:t> </a:t>
+            </a:r>
+            <a:r>
+              <a:rPr lang="en-US" dirty="0" smtClean="0"/>
+              <a:t>configured </a:t>
+            </a:r>
+            <a:r>
+              <a:rPr lang="en-US" dirty="0"/>
+              <a:t>at run-time. It's even possible for an object to change </a:t>
+            </a:r>
+            <a:r>
+              <a:rPr lang="en-US" dirty="0" smtClean="0"/>
+              <a:t>its</a:t>
+            </a:r>
+            <a:r>
+              <a:rPr lang="hu-HU" dirty="0" smtClean="0"/>
+              <a:t> </a:t>
+            </a:r>
+            <a:r>
+              <a:rPr lang="hu-HU" dirty="0" err="1" smtClean="0"/>
+              <a:t>implementation</a:t>
+            </a:r>
+            <a:r>
+              <a:rPr lang="hu-HU" dirty="0" smtClean="0"/>
+              <a:t> </a:t>
+            </a:r>
+            <a:r>
               <a:rPr lang="hu-HU" dirty="0" err="1"/>
-              <a:t>Related</a:t>
+              <a:t>at</a:t>
             </a:r>
             <a:r>
               <a:rPr lang="hu-HU" dirty="0"/>
@@ -8974,72 +9444,145 @@
             </a:r>
             <a:r>
               <a:rPr lang="hu-HU" dirty="0" err="1"/>
-              <a:t>Patterns</a:t>
+              <a:t>run-time</a:t>
+            </a:r>
+            <a:r>
+              <a:rPr lang="hu-HU" dirty="0" smtClean="0"/>
+              <a:t>.</a:t>
+            </a:r>
+          </a:p>
+          <a:p>
+            <a:pPr lvl="1"/>
+            <a:r>
+              <a:rPr lang="en-US" dirty="0"/>
+              <a:t>this decoupling encourages layering that can lead to </a:t>
+            </a:r>
+            <a:r>
+              <a:rPr lang="en-US" dirty="0" smtClean="0"/>
+              <a:t>a</a:t>
+            </a:r>
+            <a:r>
+              <a:rPr lang="hu-HU" dirty="0" smtClean="0"/>
+              <a:t> </a:t>
+            </a:r>
+            <a:r>
+              <a:rPr lang="en-US" dirty="0" smtClean="0"/>
+              <a:t>better-structured </a:t>
+            </a:r>
+            <a:r>
+              <a:rPr lang="en-US" dirty="0"/>
+              <a:t>system. The high-level part of a system only has to </a:t>
+            </a:r>
+            <a:r>
+              <a:rPr lang="en-US" dirty="0" smtClean="0"/>
+              <a:t>know</a:t>
+            </a:r>
+            <a:r>
+              <a:rPr lang="hu-HU" dirty="0" smtClean="0"/>
+              <a:t> </a:t>
+            </a:r>
+            <a:r>
+              <a:rPr lang="hu-HU" dirty="0" err="1" smtClean="0"/>
+              <a:t>about</a:t>
+            </a:r>
+            <a:r>
+              <a:rPr lang="hu-HU" dirty="0" smtClean="0"/>
+              <a:t> </a:t>
+            </a:r>
+            <a:r>
+              <a:rPr lang="hu-HU" dirty="0" err="1"/>
+              <a:t>Abstraction</a:t>
+            </a:r>
+            <a:r>
+              <a:rPr lang="hu-HU" dirty="0"/>
+              <a:t> and </a:t>
+            </a:r>
+            <a:r>
+              <a:rPr lang="hu-HU" dirty="0" err="1"/>
+              <a:t>Implementor</a:t>
+            </a:r>
+            <a:r>
+              <a:rPr lang="hu-HU" dirty="0" smtClean="0"/>
+              <a:t>.</a:t>
             </a:r>
             <a:endParaRPr lang="hu-HU" dirty="0"/>
           </a:p>
-        </p:txBody>
-      </p:sp>
-      <p:sp>
-        <p:nvSpPr>
-          <p:cNvPr id="3" name="Tartalom helye 2"/>
-          <p:cNvSpPr>
-            <a:spLocks noGrp="1"/>
-          </p:cNvSpPr>
-          <p:nvPr>
-            <p:ph idx="1"/>
-          </p:nvPr>
-        </p:nvSpPr>
-        <p:spPr/>
-        <p:txBody>
-          <a:bodyPr/>
-          <a:lstStyle/>
-          <a:p>
+          <a:p>
+            <a:pPr lvl="1"/>
+            <a:r>
+              <a:rPr lang="en-US" i="1" dirty="0"/>
+              <a:t>Improved extensibility. </a:t>
+            </a:r>
             <a:r>
               <a:rPr lang="en-US" dirty="0"/>
-              <a:t>Bridge - has a structure similar to an object adapter, but Bridge has a different intent: It is meant to separate an interface from its implementation so that they can be varied easily and independently. An adapter is meant to change the interface </a:t>
-            </a:r>
-            <a:r>
-              <a:rPr lang="sv-SE" dirty="0" err="1"/>
-              <a:t>of</a:t>
-            </a:r>
-            <a:r>
-              <a:rPr lang="sv-SE" dirty="0"/>
-              <a:t> an </a:t>
-            </a:r>
-            <a:r>
-              <a:rPr lang="sv-SE" i="1" dirty="0" err="1"/>
-              <a:t>existing</a:t>
-            </a:r>
-            <a:r>
-              <a:rPr lang="sv-SE" i="1" dirty="0"/>
-              <a:t> </a:t>
-            </a:r>
-            <a:r>
-              <a:rPr lang="sv-SE" dirty="0" err="1"/>
-              <a:t>object</a:t>
-            </a:r>
-            <a:r>
-              <a:rPr lang="sv-SE" dirty="0"/>
+              <a:t>You can extend the Abstraction and </a:t>
+            </a:r>
+            <a:r>
+              <a:rPr lang="en-US" dirty="0" err="1" smtClean="0"/>
+              <a:t>Implementor</a:t>
+            </a:r>
+            <a:r>
+              <a:rPr lang="hu-HU" dirty="0" smtClean="0"/>
+              <a:t> </a:t>
+            </a:r>
+            <a:r>
+              <a:rPr lang="hu-HU" dirty="0" err="1" smtClean="0"/>
+              <a:t>hierarchies</a:t>
+            </a:r>
+            <a:r>
+              <a:rPr lang="hu-HU" dirty="0" smtClean="0"/>
+              <a:t> </a:t>
+            </a:r>
+            <a:r>
+              <a:rPr lang="hu-HU" dirty="0" err="1"/>
+              <a:t>independently</a:t>
+            </a:r>
+            <a:r>
+              <a:rPr lang="hu-HU" dirty="0" smtClean="0"/>
               <a:t>.</a:t>
             </a:r>
           </a:p>
           <a:p>
-            <a:r>
-              <a:rPr lang="hu-HU" dirty="0"/>
-              <a:t>Facade - </a:t>
+            <a:pPr lvl="1"/>
+            <a:r>
+              <a:rPr lang="en-US" i="1" dirty="0"/>
+              <a:t>Hiding implementation details from clients. </a:t>
             </a:r>
             <a:r>
               <a:rPr lang="en-US" dirty="0"/>
-              <a:t>Provide a unified interface to a set of interfaces in a subsystem. Facade defines a higher-level interface that makes the subsystem easier to use.</a:t>
-            </a:r>
-            <a:endParaRPr lang="hu-HU" dirty="0"/>
-          </a:p>
-        </p:txBody>
-      </p:sp>
-      <p:sp>
-        <p:nvSpPr>
-          <p:cNvPr id="4" name="Slide Number Placeholder 3"/>
+              <a:t>You can shield clients </a:t>
+            </a:r>
+            <a:r>
+              <a:rPr lang="en-US" dirty="0" smtClean="0"/>
+              <a:t>from</a:t>
+            </a:r>
+            <a:r>
+              <a:rPr lang="hu-HU" dirty="0" smtClean="0"/>
+              <a:t> </a:t>
+            </a:r>
+            <a:r>
+              <a:rPr lang="en-US" dirty="0" smtClean="0"/>
+              <a:t>implementation </a:t>
+            </a:r>
+            <a:r>
+              <a:rPr lang="en-US" dirty="0"/>
+              <a:t>details, like the sharing of </a:t>
+            </a:r>
+            <a:r>
+              <a:rPr lang="en-US" dirty="0" err="1"/>
+              <a:t>implementor</a:t>
+            </a:r>
+            <a:r>
+              <a:rPr lang="en-US" dirty="0"/>
+              <a:t> objects</a:t>
+            </a:r>
+            <a:endParaRPr lang="hu-HU" dirty="0" smtClean="0"/>
+          </a:p>
+        </p:txBody>
+      </p:sp>
+      <p:sp>
+        <p:nvSpPr>
+          <p:cNvPr id="4" name="Dia számának helye 3"/>
           <p:cNvSpPr>
             <a:spLocks noGrp="1"/>
           </p:cNvSpPr>
@@ -9063,7 +9606,7 @@
     </p:spTree>
     <p:extLst>
       <p:ext uri="{BB962C8B-B14F-4D97-AF65-F5344CB8AC3E}">
-        <p14:creationId xmlns:p14="http://schemas.microsoft.com/office/powerpoint/2010/main" val="424542634"/>
+        <p14:creationId xmlns:p14="http://schemas.microsoft.com/office/powerpoint/2010/main" val="3641942723"/>
       </p:ext>
     </p:extLst>
   </p:cSld>
@@ -9107,31 +9650,15 @@
           <a:p>
             <a:r>
               <a:rPr lang="hu-HU" dirty="0" err="1" smtClean="0"/>
-              <a:t>Bridge</a:t>
-            </a:r>
-            <a:r>
-              <a:rPr lang="hu-HU" dirty="0" smtClean="0"/>
-              <a:t> </a:t>
-            </a:r>
-            <a:r>
-              <a:rPr lang="hu-HU" dirty="0"/>
-              <a:t>in</a:t>
-            </a:r>
-            <a:r>
-              <a:rPr lang="sv-SE" dirty="0"/>
-              <a:t> </a:t>
-            </a:r>
-            <a:r>
-              <a:rPr lang="sv-SE" dirty="0" err="1"/>
-              <a:t>our</a:t>
-            </a:r>
-            <a:r>
-              <a:rPr lang="sv-SE" dirty="0"/>
-              <a:t> </a:t>
-            </a:r>
-            <a:r>
-              <a:rPr lang="sv-SE" dirty="0" err="1"/>
-              <a:t>Application</a:t>
+              <a:t>Common</a:t>
+            </a:r>
+            <a:r>
+              <a:rPr lang="hu-HU" dirty="0" smtClean="0"/>
+              <a:t> </a:t>
+            </a:r>
+            <a:r>
+              <a:rPr lang="hu-HU" dirty="0" err="1" smtClean="0"/>
+              <a:t>Usages</a:t>
             </a:r>
             <a:endParaRPr lang="hu-HU" dirty="0"/>
           </a:p>
@@ -9153,28 +9680,163 @@
           <a:lstStyle/>
           <a:p>
             <a:r>
-              <a:rPr lang="sv-SE" dirty="0"/>
-              <a:t>Results for searching to </a:t>
-            </a:r>
-            <a:r>
-              <a:rPr lang="sv-SE" dirty="0" smtClean="0"/>
-              <a:t>”</a:t>
+              <a:rPr lang="hu-HU" dirty="0" err="1" smtClean="0"/>
+              <a:t>Persistence</a:t>
+            </a:r>
+            <a:endParaRPr lang="hu-HU" dirty="0" smtClean="0"/>
+          </a:p>
+          <a:p>
+            <a:pPr lvl="1"/>
+            <a:r>
+              <a:rPr lang="hu-HU" dirty="0" err="1" smtClean="0"/>
+              <a:t>Database</a:t>
+            </a:r>
+            <a:r>
+              <a:rPr lang="hu-HU" dirty="0" smtClean="0"/>
+              <a:t> </a:t>
+            </a:r>
+            <a:r>
+              <a:rPr lang="hu-HU" dirty="0" err="1" smtClean="0"/>
+              <a:t>persistence</a:t>
+            </a:r>
+            <a:endParaRPr lang="hu-HU" dirty="0" smtClean="0"/>
+          </a:p>
+          <a:p>
+            <a:pPr lvl="1"/>
+            <a:r>
+              <a:rPr lang="hu-HU" dirty="0" err="1" smtClean="0"/>
+              <a:t>Filesystem</a:t>
+            </a:r>
+            <a:r>
+              <a:rPr lang="hu-HU" dirty="0" smtClean="0"/>
+              <a:t> </a:t>
+            </a:r>
+            <a:r>
+              <a:rPr lang="hu-HU" dirty="0" err="1" smtClean="0"/>
+              <a:t>persistence</a:t>
+            </a:r>
+            <a:endParaRPr lang="hu-HU" dirty="0" smtClean="0"/>
+          </a:p>
+          <a:p>
+            <a:pPr lvl="1"/>
+            <a:r>
+              <a:rPr lang="hu-HU" dirty="0" err="1" smtClean="0"/>
+              <a:t>Streaming</a:t>
+            </a:r>
+            <a:r>
+              <a:rPr lang="hu-HU" dirty="0" smtClean="0"/>
+              <a:t> over </a:t>
+            </a:r>
+            <a:r>
+              <a:rPr lang="hu-HU" dirty="0" err="1" smtClean="0"/>
+              <a:t>the</a:t>
+            </a:r>
+            <a:r>
+              <a:rPr lang="hu-HU" dirty="0" smtClean="0"/>
+              <a:t> </a:t>
+            </a:r>
+            <a:r>
+              <a:rPr lang="hu-HU" dirty="0" err="1" smtClean="0"/>
+              <a:t>network</a:t>
+            </a:r>
+            <a:r>
+              <a:rPr lang="hu-HU" dirty="0" smtClean="0"/>
+              <a:t> </a:t>
+            </a:r>
+            <a:r>
+              <a:rPr lang="hu-HU" dirty="0" err="1" smtClean="0"/>
+              <a:t>persistence</a:t>
+            </a:r>
+            <a:endParaRPr lang="hu-HU" dirty="0" smtClean="0"/>
+          </a:p>
+          <a:p>
+            <a:endParaRPr lang="hu-HU" dirty="0"/>
+          </a:p>
+          <a:p>
+            <a:r>
+              <a:rPr lang="hu-HU" dirty="0" err="1" smtClean="0"/>
+              <a:t>User</a:t>
+            </a:r>
+            <a:r>
+              <a:rPr lang="hu-HU" dirty="0" smtClean="0"/>
+              <a:t> </a:t>
+            </a:r>
+            <a:r>
+              <a:rPr lang="hu-HU" dirty="0" err="1" smtClean="0"/>
+              <a:t>Interface</a:t>
+            </a:r>
+            <a:endParaRPr lang="hu-HU" dirty="0" smtClean="0"/>
+          </a:p>
+          <a:p>
+            <a:pPr lvl="1"/>
+            <a:r>
+              <a:rPr lang="hu-HU" dirty="0" err="1" smtClean="0"/>
+              <a:t>Multiplatform</a:t>
+            </a:r>
+            <a:r>
+              <a:rPr lang="hu-HU" dirty="0" smtClean="0"/>
+              <a:t> </a:t>
+            </a:r>
+            <a:r>
+              <a:rPr lang="hu-HU" dirty="0" err="1" smtClean="0"/>
+              <a:t>interfaces</a:t>
+            </a:r>
+            <a:r>
+              <a:rPr lang="hu-HU" dirty="0" smtClean="0"/>
+              <a:t> </a:t>
+            </a:r>
+            <a:r>
+              <a:rPr lang="hu-HU" dirty="0" err="1" smtClean="0"/>
+              <a:t>usually</a:t>
+            </a:r>
+            <a:r>
+              <a:rPr lang="hu-HU" dirty="0" smtClean="0"/>
+              <a:t> </a:t>
+            </a:r>
+            <a:r>
+              <a:rPr lang="hu-HU" dirty="0" err="1" smtClean="0"/>
+              <a:t>using</a:t>
+            </a:r>
+            <a:r>
+              <a:rPr lang="hu-HU" dirty="0" smtClean="0"/>
+              <a:t> </a:t>
+            </a:r>
+            <a:r>
+              <a:rPr lang="hu-HU" dirty="0" err="1" smtClean="0"/>
+              <a:t>the</a:t>
+            </a:r>
+            <a:r>
+              <a:rPr lang="hu-HU" dirty="0" smtClean="0"/>
+              <a:t> </a:t>
             </a:r>
             <a:r>
               <a:rPr lang="hu-HU" dirty="0" err="1" smtClean="0"/>
               <a:t>Bridge</a:t>
             </a:r>
             <a:r>
-              <a:rPr lang="sv-SE" dirty="0" smtClean="0"/>
-              <a:t>”: </a:t>
-            </a:r>
-            <a:endParaRPr lang="sv-SE" dirty="0"/>
-          </a:p>
-        </p:txBody>
-      </p:sp>
-      <p:sp>
-        <p:nvSpPr>
-          <p:cNvPr id="4" name="Slide Number Placeholder 3"/>
+              <a:rPr lang="hu-HU" dirty="0" smtClean="0"/>
+              <a:t> </a:t>
+            </a:r>
+            <a:r>
+              <a:rPr lang="hu-HU" dirty="0" err="1" smtClean="0"/>
+              <a:t>Pattern</a:t>
+            </a:r>
+            <a:r>
+              <a:rPr lang="hu-HU" dirty="0" smtClean="0"/>
+              <a:t>.</a:t>
+            </a:r>
+          </a:p>
+          <a:p>
+            <a:pPr marL="457200" lvl="1" indent="0">
+              <a:buNone/>
+            </a:pPr>
+            <a:endParaRPr lang="hu-HU" dirty="0" smtClean="0"/>
+          </a:p>
+        </p:txBody>
+      </p:sp>
+      <p:sp>
+        <p:nvSpPr>
+          <p:cNvPr id="4" name="Dia számának helye 3"/>
           <p:cNvSpPr>
             <a:spLocks noGrp="1"/>
           </p:cNvSpPr>
@@ -9198,7 +9860,7 @@
     </p:spTree>
     <p:extLst>
       <p:ext uri="{BB962C8B-B14F-4D97-AF65-F5344CB8AC3E}">
-        <p14:creationId xmlns:p14="http://schemas.microsoft.com/office/powerpoint/2010/main" val="1736693063"/>
+        <p14:creationId xmlns:p14="http://schemas.microsoft.com/office/powerpoint/2010/main" val="12491424"/>
       </p:ext>
     </p:extLst>
   </p:cSld>
@@ -9242,7 +9904,15 @@
           <a:p>
             <a:r>
               <a:rPr lang="hu-HU" dirty="0" err="1"/>
-              <a:t>References</a:t>
+              <a:t>Related</a:t>
+            </a:r>
+            <a:r>
+              <a:rPr lang="hu-HU" dirty="0"/>
+              <a:t> </a:t>
+            </a:r>
+            <a:r>
+              <a:rPr lang="hu-HU" dirty="0" err="1"/>
+              <a:t>Patterns</a:t>
             </a:r>
             <a:endParaRPr lang="hu-HU" dirty="0"/>
           </a:p>
@@ -9260,54 +9930,134 @@
         </p:nvSpPr>
         <p:spPr/>
         <p:txBody>
-          <a:bodyPr/>
+          <a:bodyPr>
+            <a:normAutofit/>
+          </a:bodyPr>
           <a:lstStyle/>
           <a:p>
             <a:r>
+              <a:rPr lang="en-US" dirty="0" smtClean="0"/>
+              <a:t>The </a:t>
+            </a:r>
+            <a:r>
               <a:rPr lang="en-US" dirty="0"/>
-              <a:t>Design Patterns: Elements of Reusable Object-Oriented Software</a:t>
+              <a:t>Adapter </a:t>
+            </a:r>
+            <a:r>
+              <a:rPr lang="en-US" dirty="0" smtClean="0"/>
+              <a:t>pattern </a:t>
+            </a:r>
+            <a:r>
+              <a:rPr lang="en-US" dirty="0"/>
+              <a:t>is geared toward making unrelated classes work together</a:t>
+            </a:r>
+            <a:r>
+              <a:rPr lang="en-US" dirty="0" smtClean="0"/>
+              <a:t>.</a:t>
+            </a:r>
+            <a:r>
+              <a:rPr lang="hu-HU" dirty="0" smtClean="0"/>
+              <a:t> </a:t>
+            </a:r>
+            <a:r>
+              <a:rPr lang="en-US" dirty="0" smtClean="0"/>
+              <a:t>It </a:t>
+            </a:r>
+            <a:r>
+              <a:rPr lang="en-US" dirty="0"/>
+              <a:t>is usually applied to systems after they're designed. Bridge, on the </a:t>
+            </a:r>
+            <a:r>
+              <a:rPr lang="en-US" dirty="0" smtClean="0"/>
+              <a:t>other</a:t>
+            </a:r>
+            <a:r>
+              <a:rPr lang="hu-HU" dirty="0" smtClean="0"/>
+              <a:t> </a:t>
+            </a:r>
+            <a:r>
+              <a:rPr lang="en-US" dirty="0" smtClean="0"/>
+              <a:t>hand</a:t>
+            </a:r>
+            <a:r>
+              <a:rPr lang="en-US" dirty="0"/>
+              <a:t>, is used up-front in a design to let abstractions and implementations </a:t>
+            </a:r>
+            <a:r>
+              <a:rPr lang="en-US" dirty="0" smtClean="0"/>
+              <a:t>vary</a:t>
+            </a:r>
+            <a:r>
+              <a:rPr lang="hu-HU" dirty="0" smtClean="0"/>
+              <a:t> </a:t>
+            </a:r>
+            <a:r>
+              <a:rPr lang="hu-HU" dirty="0" err="1" smtClean="0"/>
+              <a:t>independently</a:t>
             </a:r>
             <a:r>
               <a:rPr lang="hu-HU" dirty="0"/>
-              <a:t> (1994)</a:t>
+              <a:t>.</a:t>
             </a:r>
             <a:endParaRPr lang="sv-SE" dirty="0"/>
           </a:p>
           <a:p>
             <a:r>
-              <a:rPr lang="hu-HU" dirty="0"/>
-              <a:t>Head First Design </a:t>
-            </a:r>
-            <a:r>
-              <a:rPr lang="hu-HU" dirty="0" err="1" smtClean="0"/>
-              <a:t>Patterns</a:t>
-            </a:r>
-            <a:endParaRPr lang="hu-HU" dirty="0" smtClean="0"/>
-          </a:p>
-          <a:p>
-            <a:r>
-              <a:rPr lang="hu-HU" dirty="0" err="1" smtClean="0"/>
-              <a:t>PluralSight</a:t>
-            </a:r>
-            <a:r>
-              <a:rPr lang="hu-HU" dirty="0" smtClean="0"/>
-              <a:t> – Design </a:t>
-            </a:r>
-            <a:r>
-              <a:rPr lang="hu-HU" dirty="0" err="1" smtClean="0"/>
-              <a:t>Patterns</a:t>
-            </a:r>
-            <a:r>
-              <a:rPr lang="hu-HU" dirty="0" smtClean="0"/>
-              <a:t> </a:t>
-            </a:r>
-            <a:r>
-              <a:rPr lang="hu-HU" dirty="0" err="1" smtClean="0"/>
-              <a:t>Library</a:t>
-            </a:r>
-            <a:endParaRPr lang="hu-HU" dirty="0"/>
-          </a:p>
-          <a:p>
+              <a:rPr lang="hu-HU" dirty="0" err="1" smtClean="0"/>
+              <a:t>Abstract</a:t>
+            </a:r>
+            <a:r>
+              <a:rPr lang="hu-HU" dirty="0" smtClean="0"/>
+              <a:t> </a:t>
+            </a:r>
+            <a:r>
+              <a:rPr lang="hu-HU" dirty="0" err="1" smtClean="0"/>
+              <a:t>Factory</a:t>
+            </a:r>
+            <a:r>
+              <a:rPr lang="hu-HU" dirty="0" smtClean="0"/>
+              <a:t>: </a:t>
+            </a:r>
+            <a:r>
+              <a:rPr lang="hu-HU" dirty="0" err="1" smtClean="0"/>
+              <a:t>can</a:t>
+            </a:r>
+            <a:r>
+              <a:rPr lang="hu-HU" dirty="0" smtClean="0"/>
+              <a:t> </a:t>
+            </a:r>
+            <a:r>
+              <a:rPr lang="hu-HU" dirty="0" err="1" smtClean="0"/>
+              <a:t>create</a:t>
+            </a:r>
+            <a:r>
+              <a:rPr lang="hu-HU" dirty="0" smtClean="0"/>
+              <a:t> and </a:t>
+            </a:r>
+            <a:r>
+              <a:rPr lang="hu-HU" dirty="0" err="1" smtClean="0"/>
+              <a:t>configura</a:t>
+            </a:r>
+            <a:r>
+              <a:rPr lang="hu-HU" dirty="0" smtClean="0"/>
+              <a:t> a </a:t>
+            </a:r>
+            <a:r>
+              <a:rPr lang="hu-HU" dirty="0" err="1" smtClean="0"/>
+              <a:t>particular</a:t>
+            </a:r>
+            <a:r>
+              <a:rPr lang="hu-HU" dirty="0" smtClean="0"/>
+              <a:t> </a:t>
+            </a:r>
+            <a:r>
+              <a:rPr lang="hu-HU" dirty="0" err="1" smtClean="0"/>
+              <a:t>Bridge</a:t>
+            </a:r>
+            <a:r>
+              <a:rPr lang="hu-HU" dirty="0" smtClean="0"/>
+              <a:t>.</a:t>
+            </a:r>
             <a:endParaRPr lang="hu-HU" dirty="0"/>
           </a:p>
         </p:txBody>
@@ -9338,7 +10088,7 @@
     </p:spTree>
     <p:extLst>
       <p:ext uri="{BB962C8B-B14F-4D97-AF65-F5344CB8AC3E}">
-        <p14:creationId xmlns:p14="http://schemas.microsoft.com/office/powerpoint/2010/main" val="2474760466"/>
+        <p14:creationId xmlns:p14="http://schemas.microsoft.com/office/powerpoint/2010/main" val="424542634"/>
       </p:ext>
     </p:extLst>
   </p:cSld>
@@ -9375,6 +10125,376 @@
             <p:ph type="title"/>
           </p:nvPr>
         </p:nvSpPr>
+        <p:spPr/>
+        <p:txBody>
+          <a:bodyPr/>
+          <a:lstStyle/>
+          <a:p>
+            <a:r>
+              <a:rPr lang="hu-HU" dirty="0" err="1" smtClean="0"/>
+              <a:t>Bridge</a:t>
+            </a:r>
+            <a:r>
+              <a:rPr lang="hu-HU" dirty="0" smtClean="0"/>
+              <a:t> </a:t>
+            </a:r>
+            <a:r>
+              <a:rPr lang="hu-HU" dirty="0"/>
+              <a:t>in</a:t>
+            </a:r>
+            <a:r>
+              <a:rPr lang="sv-SE" dirty="0"/>
+              <a:t> </a:t>
+            </a:r>
+            <a:r>
+              <a:rPr lang="sv-SE" dirty="0" err="1"/>
+              <a:t>our</a:t>
+            </a:r>
+            <a:r>
+              <a:rPr lang="sv-SE" dirty="0"/>
+              <a:t> </a:t>
+            </a:r>
+            <a:r>
+              <a:rPr lang="sv-SE" dirty="0" err="1"/>
+              <a:t>Application</a:t>
+            </a:r>
+            <a:endParaRPr lang="hu-HU" dirty="0"/>
+          </a:p>
+        </p:txBody>
+      </p:sp>
+      <p:sp>
+        <p:nvSpPr>
+          <p:cNvPr id="3" name="Tartalom helye 2"/>
+          <p:cNvSpPr>
+            <a:spLocks noGrp="1"/>
+          </p:cNvSpPr>
+          <p:nvPr>
+            <p:ph idx="1"/>
+          </p:nvPr>
+        </p:nvSpPr>
+        <p:spPr/>
+        <p:txBody>
+          <a:bodyPr/>
+          <a:lstStyle/>
+          <a:p>
+            <a:r>
+              <a:rPr lang="sv-SE" dirty="0"/>
+              <a:t>Results for searching to </a:t>
+            </a:r>
+            <a:r>
+              <a:rPr lang="sv-SE" dirty="0" smtClean="0"/>
+              <a:t>”</a:t>
+            </a:r>
+            <a:r>
+              <a:rPr lang="hu-HU" dirty="0" err="1" smtClean="0"/>
+              <a:t>Bridge</a:t>
+            </a:r>
+            <a:r>
+              <a:rPr lang="sv-SE" dirty="0" smtClean="0"/>
+              <a:t>”: </a:t>
+            </a:r>
+            <a:endParaRPr lang="sv-SE" dirty="0"/>
+          </a:p>
+        </p:txBody>
+      </p:sp>
+      <p:sp>
+        <p:nvSpPr>
+          <p:cNvPr id="4" name="Slide Number Placeholder 3"/>
+          <p:cNvSpPr>
+            <a:spLocks noGrp="1"/>
+          </p:cNvSpPr>
+          <p:nvPr>
+            <p:ph type="sldNum" sz="quarter" idx="12"/>
+          </p:nvPr>
+        </p:nvSpPr>
+        <p:spPr/>
+        <p:txBody>
+          <a:bodyPr/>
+          <a:lstStyle/>
+          <a:p>
+            <a:fld id="{F28C9355-BD38-4B88-A605-51440FB067EA}" type="slidenum">
+              <a:rPr lang="hu-HU" smtClean="0"/>
+              <a:t>14</a:t>
+            </a:fld>
+            <a:endParaRPr lang="hu-HU"/>
+          </a:p>
+        </p:txBody>
+      </p:sp>
+    </p:spTree>
+    <p:extLst>
+      <p:ext uri="{BB962C8B-B14F-4D97-AF65-F5344CB8AC3E}">
+        <p14:creationId xmlns:p14="http://schemas.microsoft.com/office/powerpoint/2010/main" val="1736693063"/>
+      </p:ext>
+    </p:extLst>
+  </p:cSld>
+  <p:clrMapOvr>
+    <a:masterClrMapping/>
+  </p:clrMapOvr>
+</p:sld>
+</file>
+
+<file path=ppt/slides/slide15.xml><?xml version="1.0" encoding="utf-8"?>
+<p:sld xmlns:a="http://schemas.openxmlformats.org/drawingml/2006/main" xmlns:r="http://schemas.openxmlformats.org/officeDocument/2006/relationships" xmlns:p="http://schemas.openxmlformats.org/presentationml/2006/main">
+  <p:cSld>
+    <p:spTree>
+      <p:nvGrpSpPr>
+        <p:cNvPr id="1" name=""/>
+        <p:cNvGrpSpPr/>
+        <p:nvPr/>
+      </p:nvGrpSpPr>
+      <p:grpSpPr>
+        <a:xfrm>
+          <a:off x="0" y="0"/>
+          <a:ext cx="0" cy="0"/>
+          <a:chOff x="0" y="0"/>
+          <a:chExt cx="0" cy="0"/>
+        </a:xfrm>
+      </p:grpSpPr>
+      <p:sp>
+        <p:nvSpPr>
+          <p:cNvPr id="2" name="Cím 1"/>
+          <p:cNvSpPr>
+            <a:spLocks noGrp="1"/>
+          </p:cNvSpPr>
+          <p:nvPr>
+            <p:ph type="title"/>
+          </p:nvPr>
+        </p:nvSpPr>
+        <p:spPr/>
+        <p:txBody>
+          <a:bodyPr/>
+          <a:lstStyle/>
+          <a:p>
+            <a:r>
+              <a:rPr lang="hu-HU" dirty="0" err="1" smtClean="0"/>
+              <a:t>Composite</a:t>
+            </a:r>
+            <a:endParaRPr lang="hu-HU" dirty="0"/>
+          </a:p>
+        </p:txBody>
+      </p:sp>
+      <p:sp>
+        <p:nvSpPr>
+          <p:cNvPr id="3" name="Tartalom helye 2"/>
+          <p:cNvSpPr>
+            <a:spLocks noGrp="1"/>
+          </p:cNvSpPr>
+          <p:nvPr>
+            <p:ph idx="1"/>
+          </p:nvPr>
+        </p:nvSpPr>
+        <p:spPr/>
+        <p:txBody>
+          <a:bodyPr/>
+          <a:lstStyle/>
+          <a:p>
+            <a:endParaRPr lang="hu-HU"/>
+          </a:p>
+        </p:txBody>
+      </p:sp>
+      <p:sp>
+        <p:nvSpPr>
+          <p:cNvPr id="4" name="Dia számának helye 3"/>
+          <p:cNvSpPr>
+            <a:spLocks noGrp="1"/>
+          </p:cNvSpPr>
+          <p:nvPr>
+            <p:ph type="sldNum" sz="quarter" idx="12"/>
+          </p:nvPr>
+        </p:nvSpPr>
+        <p:spPr/>
+        <p:txBody>
+          <a:bodyPr/>
+          <a:lstStyle/>
+          <a:p>
+            <a:fld id="{F28C9355-BD38-4B88-A605-51440FB067EA}" type="slidenum">
+              <a:rPr lang="hu-HU" smtClean="0"/>
+              <a:t>15</a:t>
+            </a:fld>
+            <a:endParaRPr lang="hu-HU"/>
+          </a:p>
+        </p:txBody>
+      </p:sp>
+    </p:spTree>
+    <p:extLst>
+      <p:ext uri="{BB962C8B-B14F-4D97-AF65-F5344CB8AC3E}">
+        <p14:creationId xmlns:p14="http://schemas.microsoft.com/office/powerpoint/2010/main" val="4200547915"/>
+      </p:ext>
+    </p:extLst>
+  </p:cSld>
+  <p:clrMapOvr>
+    <a:masterClrMapping/>
+  </p:clrMapOvr>
+</p:sld>
+</file>
+
+<file path=ppt/slides/slide16.xml><?xml version="1.0" encoding="utf-8"?>
+<p:sld xmlns:a="http://schemas.openxmlformats.org/drawingml/2006/main" xmlns:r="http://schemas.openxmlformats.org/officeDocument/2006/relationships" xmlns:p="http://schemas.openxmlformats.org/presentationml/2006/main">
+  <p:cSld>
+    <p:spTree>
+      <p:nvGrpSpPr>
+        <p:cNvPr id="1" name=""/>
+        <p:cNvGrpSpPr/>
+        <p:nvPr/>
+      </p:nvGrpSpPr>
+      <p:grpSpPr>
+        <a:xfrm>
+          <a:off x="0" y="0"/>
+          <a:ext cx="0" cy="0"/>
+          <a:chOff x="0" y="0"/>
+          <a:chExt cx="0" cy="0"/>
+        </a:xfrm>
+      </p:grpSpPr>
+      <p:sp>
+        <p:nvSpPr>
+          <p:cNvPr id="2" name="Cím 1"/>
+          <p:cNvSpPr>
+            <a:spLocks noGrp="1"/>
+          </p:cNvSpPr>
+          <p:nvPr>
+            <p:ph type="title"/>
+          </p:nvPr>
+        </p:nvSpPr>
+        <p:spPr/>
+        <p:txBody>
+          <a:bodyPr/>
+          <a:lstStyle/>
+          <a:p>
+            <a:r>
+              <a:rPr lang="hu-HU" dirty="0" err="1"/>
+              <a:t>References</a:t>
+            </a:r>
+            <a:endParaRPr lang="hu-HU" dirty="0"/>
+          </a:p>
+        </p:txBody>
+      </p:sp>
+      <p:sp>
+        <p:nvSpPr>
+          <p:cNvPr id="3" name="Tartalom helye 2"/>
+          <p:cNvSpPr>
+            <a:spLocks noGrp="1"/>
+          </p:cNvSpPr>
+          <p:nvPr>
+            <p:ph idx="1"/>
+          </p:nvPr>
+        </p:nvSpPr>
+        <p:spPr/>
+        <p:txBody>
+          <a:bodyPr/>
+          <a:lstStyle/>
+          <a:p>
+            <a:r>
+              <a:rPr lang="en-US" dirty="0"/>
+              <a:t>Design Patterns: Elements of Reusable Object-Oriented Software</a:t>
+            </a:r>
+            <a:r>
+              <a:rPr lang="hu-HU" dirty="0"/>
+              <a:t> (1994)</a:t>
+            </a:r>
+            <a:endParaRPr lang="sv-SE" dirty="0"/>
+          </a:p>
+          <a:p>
+            <a:r>
+              <a:rPr lang="hu-HU" dirty="0"/>
+              <a:t>Head First Design </a:t>
+            </a:r>
+            <a:r>
+              <a:rPr lang="hu-HU" dirty="0" err="1" smtClean="0"/>
+              <a:t>Patterns</a:t>
+            </a:r>
+            <a:endParaRPr lang="hu-HU" dirty="0" smtClean="0"/>
+          </a:p>
+          <a:p>
+            <a:r>
+              <a:rPr lang="hu-HU" dirty="0" err="1" smtClean="0"/>
+              <a:t>PluralSight</a:t>
+            </a:r>
+            <a:r>
+              <a:rPr lang="hu-HU" dirty="0" smtClean="0"/>
+              <a:t> – Design </a:t>
+            </a:r>
+            <a:r>
+              <a:rPr lang="hu-HU" dirty="0" err="1" smtClean="0"/>
+              <a:t>Patterns</a:t>
+            </a:r>
+            <a:r>
+              <a:rPr lang="hu-HU" dirty="0" smtClean="0"/>
+              <a:t> </a:t>
+            </a:r>
+            <a:r>
+              <a:rPr lang="hu-HU" dirty="0" err="1" smtClean="0"/>
+              <a:t>Library</a:t>
+            </a:r>
+            <a:endParaRPr lang="hu-HU" dirty="0"/>
+          </a:p>
+          <a:p>
+            <a:endParaRPr lang="hu-HU" dirty="0"/>
+          </a:p>
+        </p:txBody>
+      </p:sp>
+      <p:sp>
+        <p:nvSpPr>
+          <p:cNvPr id="4" name="Slide Number Placeholder 3"/>
+          <p:cNvSpPr>
+            <a:spLocks noGrp="1"/>
+          </p:cNvSpPr>
+          <p:nvPr>
+            <p:ph type="sldNum" sz="quarter" idx="12"/>
+          </p:nvPr>
+        </p:nvSpPr>
+        <p:spPr/>
+        <p:txBody>
+          <a:bodyPr/>
+          <a:lstStyle/>
+          <a:p>
+            <a:fld id="{F28C9355-BD38-4B88-A605-51440FB067EA}" type="slidenum">
+              <a:rPr lang="hu-HU" smtClean="0"/>
+              <a:t>16</a:t>
+            </a:fld>
+            <a:endParaRPr lang="hu-HU"/>
+          </a:p>
+        </p:txBody>
+      </p:sp>
+    </p:spTree>
+    <p:extLst>
+      <p:ext uri="{BB962C8B-B14F-4D97-AF65-F5344CB8AC3E}">
+        <p14:creationId xmlns:p14="http://schemas.microsoft.com/office/powerpoint/2010/main" val="2474760466"/>
+      </p:ext>
+    </p:extLst>
+  </p:cSld>
+  <p:clrMapOvr>
+    <a:masterClrMapping/>
+  </p:clrMapOvr>
+</p:sld>
+</file>
+
+<file path=ppt/slides/slide17.xml><?xml version="1.0" encoding="utf-8"?>
+<p:sld xmlns:a="http://schemas.openxmlformats.org/drawingml/2006/main" xmlns:r="http://schemas.openxmlformats.org/officeDocument/2006/relationships" xmlns:p="http://schemas.openxmlformats.org/presentationml/2006/main">
+  <p:cSld>
+    <p:spTree>
+      <p:nvGrpSpPr>
+        <p:cNvPr id="1" name=""/>
+        <p:cNvGrpSpPr/>
+        <p:nvPr/>
+      </p:nvGrpSpPr>
+      <p:grpSpPr>
+        <a:xfrm>
+          <a:off x="0" y="0"/>
+          <a:ext cx="0" cy="0"/>
+          <a:chOff x="0" y="0"/>
+          <a:chExt cx="0" cy="0"/>
+        </a:xfrm>
+      </p:grpSpPr>
+      <p:sp>
+        <p:nvSpPr>
+          <p:cNvPr id="2" name="Cím 1"/>
+          <p:cNvSpPr>
+            <a:spLocks noGrp="1"/>
+          </p:cNvSpPr>
+          <p:nvPr>
+            <p:ph type="title"/>
+          </p:nvPr>
+        </p:nvSpPr>
         <p:spPr>
           <a:xfrm>
             <a:off x="740924" y="2816495"/>
@@ -9413,7 +10533,7 @@
           <a:p>
             <a:fld id="{F28C9355-BD38-4B88-A605-51440FB067EA}" type="slidenum">
               <a:rPr lang="hu-HU" smtClean="0"/>
-              <a:t>14</a:t>
+              <a:t>17</a:t>
             </a:fld>
             <a:endParaRPr lang="hu-HU"/>
           </a:p>
@@ -9491,6 +10611,78 @@
               <a:t>Bridge</a:t>
             </a:r>
             <a:r>
+              <a:rPr lang="hu-HU" dirty="0" smtClean="0"/>
+              <a:t> </a:t>
+            </a:r>
+            <a:r>
+              <a:rPr lang="hu-HU" dirty="0" err="1" smtClean="0"/>
+              <a:t>Pattern</a:t>
+            </a:r>
+            <a:endParaRPr lang="hu-HU" dirty="0" smtClean="0"/>
+          </a:p>
+          <a:p>
+            <a:pPr lvl="1"/>
+            <a:r>
+              <a:rPr lang="sv-SE" dirty="0"/>
+              <a:t>Real life example</a:t>
+            </a:r>
+          </a:p>
+          <a:p>
+            <a:pPr lvl="1"/>
+            <a:r>
+              <a:rPr lang="sv-SE" dirty="0"/>
+              <a:t>Code example</a:t>
+            </a:r>
+          </a:p>
+          <a:p>
+            <a:pPr lvl="1"/>
+            <a:r>
+              <a:rPr lang="sv-SE" dirty="0"/>
+              <a:t>Class Diagram</a:t>
+            </a:r>
+          </a:p>
+          <a:p>
+            <a:pPr lvl="1"/>
+            <a:r>
+              <a:rPr lang="sv-SE" dirty="0"/>
+              <a:t>Co</a:t>
+            </a:r>
+            <a:r>
+              <a:rPr lang="hu-HU" dirty="0" err="1"/>
+              <a:t>mmon</a:t>
+            </a:r>
+            <a:r>
+              <a:rPr lang="hu-HU" dirty="0"/>
+              <a:t> </a:t>
+            </a:r>
+            <a:r>
+              <a:rPr lang="hu-HU" dirty="0" err="1"/>
+              <a:t>usages</a:t>
+            </a:r>
+            <a:endParaRPr lang="hu-HU" dirty="0"/>
+          </a:p>
+          <a:p>
+            <a:pPr lvl="1"/>
+            <a:r>
+              <a:rPr lang="hu-HU" dirty="0" err="1"/>
+              <a:t>Applicability</a:t>
+            </a:r>
+            <a:endParaRPr lang="hu-HU" dirty="0"/>
+          </a:p>
+          <a:p>
+            <a:pPr lvl="1"/>
+            <a:r>
+              <a:rPr lang="hu-HU" dirty="0" err="1" smtClean="0"/>
+              <a:t>Consequences</a:t>
+            </a:r>
+            <a:endParaRPr lang="hu-HU" dirty="0" smtClean="0"/>
+          </a:p>
+          <a:p>
+            <a:r>
+              <a:rPr lang="hu-HU" dirty="0" err="1" smtClean="0"/>
+              <a:t>Composite</a:t>
+            </a:r>
+            <a:r>
               <a:rPr lang="sv-SE" dirty="0" smtClean="0"/>
               <a:t> </a:t>
             </a:r>
@@ -9501,60 +10693,10 @@
           </a:p>
           <a:p>
             <a:pPr lvl="1"/>
-            <a:r>
-              <a:rPr lang="sv-SE" dirty="0"/>
-              <a:t>Real </a:t>
-            </a:r>
-            <a:r>
-              <a:rPr lang="sv-SE" dirty="0" err="1"/>
-              <a:t>life</a:t>
-            </a:r>
-            <a:r>
-              <a:rPr lang="sv-SE" dirty="0"/>
-              <a:t> </a:t>
-            </a:r>
-            <a:r>
-              <a:rPr lang="sv-SE" dirty="0" err="1"/>
-              <a:t>example</a:t>
-            </a:r>
             <a:endParaRPr lang="sv-SE" dirty="0"/>
           </a:p>
           <a:p>
             <a:pPr lvl="1"/>
-            <a:r>
-              <a:rPr lang="sv-SE" dirty="0"/>
-              <a:t>Code example</a:t>
-            </a:r>
-          </a:p>
-          <a:p>
-            <a:pPr lvl="1"/>
-            <a:r>
-              <a:rPr lang="sv-SE" dirty="0" smtClean="0"/>
-              <a:t>Class </a:t>
-            </a:r>
-            <a:r>
-              <a:rPr lang="sv-SE" dirty="0"/>
-              <a:t>Diagram</a:t>
-            </a:r>
-          </a:p>
-          <a:p>
-            <a:pPr lvl="1"/>
-            <a:r>
-              <a:rPr lang="sv-SE" dirty="0" smtClean="0"/>
-              <a:t>Co</a:t>
-            </a:r>
-            <a:r>
-              <a:rPr lang="hu-HU" dirty="0" err="1" smtClean="0"/>
-              <a:t>mmon</a:t>
-            </a:r>
-            <a:r>
-              <a:rPr lang="hu-HU" dirty="0" smtClean="0"/>
-              <a:t> </a:t>
-            </a:r>
-            <a:r>
-              <a:rPr lang="hu-HU" dirty="0" err="1" smtClean="0"/>
-              <a:t>usages</a:t>
-            </a:r>
             <a:endParaRPr lang="sv-SE" dirty="0"/>
           </a:p>
         </p:txBody>
@@ -10644,14 +11786,10 @@
           <a:p>
             <a:r>
               <a:rPr lang="hu-HU" dirty="0"/>
-              <a:t>https</a:t>
-            </a:r>
-            <a:r>
-              <a:rPr lang="hu-HU"/>
-              <a:t>://</a:t>
-            </a:r>
-            <a:r>
-              <a:rPr lang="hu-HU" smtClean="0"/>
+              <a:t>https://</a:t>
+            </a:r>
+            <a:r>
+              <a:rPr lang="hu-HU" dirty="0" smtClean="0"/>
               <a:t>github.com/esziger/design_patterns/tree/master/Bridge_Examples/BridgeExample_BackwardsBook/</a:t>
             </a:r>
             <a:endParaRPr lang="hu-HU" dirty="0" smtClean="0"/>
@@ -10703,8 +11841,8 @@
         </p:blipFill>
         <p:spPr>
           <a:xfrm>
-            <a:off x="2474676" y="3681751"/>
-            <a:ext cx="7507524" cy="2029397"/>
+            <a:off x="1055473" y="3286126"/>
+            <a:ext cx="10081054" cy="2725061"/>
           </a:xfrm>
           <a:prstGeom prst="rect">
             <a:avLst/>

</xml_diff>